<commit_message>
Kunal 6.5, 2016 added
</commit_message>
<xml_diff>
--- a/Drug Money Slides.pptx
+++ b/Drug Money Slides.pptx
@@ -7,9 +7,9 @@
   <p:sldIdLst>
     <p:sldId id="257" r:id="rId2"/>
     <p:sldId id="263" r:id="rId3"/>
-    <p:sldId id="261" r:id="rId4"/>
-    <p:sldId id="259" r:id="rId5"/>
-    <p:sldId id="262" r:id="rId6"/>
+    <p:sldId id="264" r:id="rId4"/>
+    <p:sldId id="266" r:id="rId5"/>
+    <p:sldId id="267" r:id="rId6"/>
   </p:sldIdLst>
   <p:sldSz cx="12192000" cy="6858000"/>
   <p:notesSz cx="6858000" cy="9144000"/>
@@ -108,6 +108,11 @@
       </a:defRPr>
     </a:lvl9pPr>
   </p:defaultTextStyle>
+  <p:extLst>
+    <p:ext uri="{EFAFB233-063F-42B5-8137-9DF3F51BA10A}">
+      <p15:sldGuideLst xmlns:p15="http://schemas.microsoft.com/office/powerpoint/2012/main"/>
+    </p:ext>
+  </p:extLst>
 </p:presentation>
 </file>
 
@@ -274,7 +279,7 @@
           <a:p>
             <a:fld id="{48A87A34-81AB-432B-8DAE-1953F412C126}" type="datetimeFigureOut">
               <a:rPr lang="en-US" smtClean="0"/>
-              <a:t>6/4/18</a:t>
+              <a:t>6/5/18</a:t>
             </a:fld>
             <a:endParaRPr lang="en-US" dirty="0"/>
           </a:p>
@@ -444,7 +449,7 @@
           <a:p>
             <a:fld id="{48A87A34-81AB-432B-8DAE-1953F412C126}" type="datetimeFigureOut">
               <a:rPr lang="en-US" smtClean="0"/>
-              <a:t>6/4/18</a:t>
+              <a:t>6/5/18</a:t>
             </a:fld>
             <a:endParaRPr lang="en-US" dirty="0"/>
           </a:p>
@@ -624,7 +629,7 @@
           <a:p>
             <a:fld id="{48A87A34-81AB-432B-8DAE-1953F412C126}" type="datetimeFigureOut">
               <a:rPr lang="en-US" smtClean="0"/>
-              <a:t>6/4/18</a:t>
+              <a:t>6/5/18</a:t>
             </a:fld>
             <a:endParaRPr lang="en-US" dirty="0"/>
           </a:p>
@@ -794,7 +799,7 @@
           <a:p>
             <a:fld id="{48A87A34-81AB-432B-8DAE-1953F412C126}" type="datetimeFigureOut">
               <a:rPr lang="en-US" smtClean="0"/>
-              <a:t>6/4/18</a:t>
+              <a:t>6/5/18</a:t>
             </a:fld>
             <a:endParaRPr lang="en-US" dirty="0"/>
           </a:p>
@@ -1062,7 +1067,7 @@
           <a:p>
             <a:fld id="{48A87A34-81AB-432B-8DAE-1953F412C126}" type="datetimeFigureOut">
               <a:rPr lang="en-US" smtClean="0"/>
-              <a:t>6/4/18</a:t>
+              <a:t>6/5/18</a:t>
             </a:fld>
             <a:endParaRPr lang="en-US" dirty="0"/>
           </a:p>
@@ -1294,7 +1299,7 @@
           <a:p>
             <a:fld id="{48A87A34-81AB-432B-8DAE-1953F412C126}" type="datetimeFigureOut">
               <a:rPr lang="en-US" smtClean="0"/>
-              <a:t>6/4/18</a:t>
+              <a:t>6/5/18</a:t>
             </a:fld>
             <a:endParaRPr lang="en-US" dirty="0"/>
           </a:p>
@@ -1654,7 +1659,7 @@
             <a:fld id="{48A87A34-81AB-432B-8DAE-1953F412C126}" type="datetimeFigureOut">
               <a:rPr lang="en-US" smtClean="0"/>
               <a:pPr/>
-              <a:t>6/4/18</a:t>
+              <a:t>6/5/18</a:t>
             </a:fld>
             <a:endParaRPr lang="en-US" dirty="0"/>
           </a:p>
@@ -1796,7 +1801,7 @@
           <a:p>
             <a:fld id="{48A87A34-81AB-432B-8DAE-1953F412C126}" type="datetimeFigureOut">
               <a:rPr lang="en-US" smtClean="0"/>
-              <a:t>6/4/18</a:t>
+              <a:t>6/5/18</a:t>
             </a:fld>
             <a:endParaRPr lang="en-US" dirty="0"/>
           </a:p>
@@ -1891,7 +1896,7 @@
           <a:p>
             <a:fld id="{48A87A34-81AB-432B-8DAE-1953F412C126}" type="datetimeFigureOut">
               <a:rPr lang="en-US" smtClean="0"/>
-              <a:t>6/4/18</a:t>
+              <a:t>6/5/18</a:t>
             </a:fld>
             <a:endParaRPr lang="en-US" dirty="0"/>
           </a:p>
@@ -2248,7 +2253,7 @@
           <a:p>
             <a:fld id="{48A87A34-81AB-432B-8DAE-1953F412C126}" type="datetimeFigureOut">
               <a:rPr lang="en-US" smtClean="0"/>
-              <a:t>6/4/18</a:t>
+              <a:t>6/5/18</a:t>
             </a:fld>
             <a:endParaRPr lang="en-US" dirty="0"/>
           </a:p>
@@ -2606,7 +2611,7 @@
             <a:fld id="{48A87A34-81AB-432B-8DAE-1953F412C126}" type="datetimeFigureOut">
               <a:rPr lang="en-US" smtClean="0"/>
               <a:pPr/>
-              <a:t>6/4/18</a:t>
+              <a:t>6/5/18</a:t>
             </a:fld>
             <a:endParaRPr lang="en-US" dirty="0"/>
           </a:p>
@@ -2848,7 +2853,7 @@
             <a:fld id="{48A87A34-81AB-432B-8DAE-1953F412C126}" type="datetimeFigureOut">
               <a:rPr lang="en-US" smtClean="0"/>
               <a:pPr/>
-              <a:t>6/4/18</a:t>
+              <a:t>6/5/18</a:t>
             </a:fld>
             <a:endParaRPr lang="en-US" dirty="0"/>
           </a:p>
@@ -3331,7 +3336,7 @@
         </p:nvSpPr>
         <p:spPr>
           <a:xfrm>
-            <a:off x="8285860" y="4808422"/>
+            <a:off x="8285860" y="4402022"/>
             <a:ext cx="3451592" cy="498763"/>
           </a:xfrm>
           <a:prstGeom prst="rect">
@@ -3553,9 +3558,9 @@
               <a:buNone/>
             </a:pPr>
             <a:r>
-              <a:rPr lang="en-US" sz="2000" dirty="0">
-                <a:solidFill>
-                  <a:schemeClr val="bg1"/>
+              <a:rPr lang="en-US" sz="2000" i="1" dirty="0">
+                <a:solidFill>
+                  <a:srgbClr val="FF9300"/>
                 </a:solidFill>
               </a:rPr>
               <a:t>An Analysis by Kunal Shah</a:t>
@@ -3577,8 +3582,8 @@
         </p:nvSpPr>
         <p:spPr>
           <a:xfrm>
-            <a:off x="6400800" y="3892105"/>
-            <a:ext cx="5367648" cy="1046440"/>
+            <a:off x="5753220" y="3454400"/>
+            <a:ext cx="5984232" cy="1107996"/>
           </a:xfrm>
           <a:prstGeom prst="rect">
             <a:avLst/>
@@ -3593,7 +3598,7 @@
           <a:p>
             <a:pPr algn="r"/>
             <a:r>
-              <a:rPr lang="en-US" sz="6200" dirty="0">
+              <a:rPr lang="en-US" sz="6600" dirty="0">
                 <a:solidFill>
                   <a:schemeClr val="bg1"/>
                 </a:solidFill>
@@ -3681,7 +3686,7 @@
 </file>
 
 <file path=ppt/slides/slide2.xml><?xml version="1.0" encoding="utf-8"?>
-<p:sld xmlns:a="http://schemas.openxmlformats.org/drawingml/2006/main" xmlns:r="http://schemas.openxmlformats.org/officeDocument/2006/relationships" xmlns:p="http://schemas.openxmlformats.org/presentationml/2006/main">
+<p:sld xmlns:a="http://schemas.openxmlformats.org/drawingml/2006/main" xmlns:r="http://schemas.openxmlformats.org/officeDocument/2006/relationships" xmlns:p="http://schemas.openxmlformats.org/presentationml/2006/main" show="0">
   <p:cSld>
     <p:bg>
       <p:bgPr>
@@ -3803,7 +3808,7 @@
                   <a:schemeClr val="bg1"/>
                 </a:solidFill>
               </a:rPr>
-              <a:t>B.A. in Biology,  Accelerated 7-Year Dentistry Program</a:t>
+              <a:t>B.A. Biology,  Accelerated 7-Year Dentistry Program</a:t>
             </a:r>
           </a:p>
           <a:p>
@@ -3933,38 +3938,6 @@
               </a:rPr>
               <a:t>-content/uploads/2014/08/concrete-texture-abstract-hd-wallpaper-1920x1080-5954.jpg</a:t>
             </a:r>
-          </a:p>
-        </p:txBody>
-      </p:sp>
-      <p:sp>
-        <p:nvSpPr>
-          <p:cNvPr id="5" name="TextBox 4">
-            <a:extLst>
-              <a:ext uri="{FF2B5EF4-FFF2-40B4-BE49-F238E27FC236}">
-                <a16:creationId xmlns:a16="http://schemas.microsoft.com/office/drawing/2014/main" id="{73E2E4E3-F471-CE46-87CD-4FAEAF72F5AA}"/>
-              </a:ext>
-            </a:extLst>
-          </p:cNvPr>
-          <p:cNvSpPr txBox="1"/>
-          <p:nvPr/>
-        </p:nvSpPr>
-        <p:spPr>
-          <a:xfrm>
-            <a:off x="12335435" y="5844988"/>
-            <a:ext cx="184731" cy="369332"/>
-          </a:xfrm>
-          <a:prstGeom prst="rect">
-            <a:avLst/>
-          </a:prstGeom>
-          <a:noFill/>
-        </p:spPr>
-        <p:txBody>
-          <a:bodyPr wrap="none" rtlCol="0">
-            <a:spAutoFit/>
-          </a:bodyPr>
-          <a:lstStyle/>
-          <a:p>
-            <a:endParaRPr lang="en-US" dirty="0"/>
           </a:p>
         </p:txBody>
       </p:sp>
@@ -4090,32 +4063,6 @@
                   <a:schemeClr val="bg1"/>
                 </a:solidFill>
               </a:rPr>
-              <a:t>70% of Americans take at least one</a:t>
-            </a:r>
-            <a:r>
-              <a:rPr lang="en-US" sz="2400" i="1" dirty="0">
-                <a:solidFill>
-                  <a:schemeClr val="bg1"/>
-                </a:solidFill>
-              </a:rPr>
-              <a:t> </a:t>
-            </a:r>
-            <a:r>
-              <a:rPr lang="en-US" sz="2400" dirty="0">
-                <a:solidFill>
-                  <a:schemeClr val="bg1"/>
-                </a:solidFill>
-              </a:rPr>
-              <a:t>prescription drug</a:t>
-            </a:r>
-          </a:p>
-          <a:p>
-            <a:r>
-              <a:rPr lang="en-US" sz="2400" dirty="0">
-                <a:solidFill>
-                  <a:schemeClr val="bg1"/>
-                </a:solidFill>
-              </a:rPr>
               <a:t>2013 Study: </a:t>
             </a:r>
           </a:p>
@@ -4141,6 +4088,9 @@
           </a:p>
           <a:p>
             <a:pPr marL="0" indent="0" algn="ctr">
+              <a:spcAft>
+                <a:spcPts val="1200"/>
+              </a:spcAft>
               <a:buNone/>
             </a:pPr>
             <a:r>
@@ -4151,6 +4101,11 @@
               </a:rPr>
               <a:t>Do the Payments Doctors receive from Pharmaceutical Companies affect the type of prescriptions they write?</a:t>
             </a:r>
+            <a:endParaRPr lang="en-US" sz="1700" i="1" dirty="0">
+              <a:solidFill>
+                <a:srgbClr val="FF9300"/>
+              </a:solidFill>
+            </a:endParaRPr>
           </a:p>
           <a:p>
             <a:r>
@@ -4159,7 +4114,7 @@
                   <a:schemeClr val="bg1"/>
                 </a:solidFill>
               </a:rPr>
-              <a:t>Datasets - Centers for Medicare &amp; Medicaid Services</a:t>
+              <a:t>Datasets via Centers for Medicare &amp; Medicaid Services</a:t>
             </a:r>
           </a:p>
           <a:p>
@@ -4170,7 +4125,15 @@
                   <a:schemeClr val="bg1"/>
                 </a:solidFill>
               </a:rPr>
-              <a:t>Medicare Part D Prescriptions (NPI)</a:t>
+              <a:t>Medicare Part D Prescriptions – </a:t>
+            </a:r>
+            <a:r>
+              <a:rPr lang="en-US" sz="2000" i="1" dirty="0">
+                <a:solidFill>
+                  <a:schemeClr val="bg1"/>
+                </a:solidFill>
+              </a:rPr>
+              <a:t>National provider Identifier (NPI)</a:t>
             </a:r>
           </a:p>
           <a:p>
@@ -4181,34 +4144,16 @@
                   <a:schemeClr val="bg1"/>
                 </a:solidFill>
               </a:rPr>
-              <a:t>Open Payments Database (Payment ID)</a:t>
-            </a:r>
-          </a:p>
-          <a:p>
-            <a:pPr lvl="2">
-              <a:spcBef>
-                <a:spcPts val="800"/>
-              </a:spcBef>
-            </a:pPr>
-            <a:r>
-              <a:rPr lang="en-US" sz="1800" dirty="0">
+              <a:t>Open Payments Database – </a:t>
+            </a:r>
+            <a:r>
+              <a:rPr lang="en-US" sz="2000" i="1" dirty="0">
                 <a:solidFill>
                   <a:schemeClr val="bg1"/>
                 </a:solidFill>
               </a:rPr>
-              <a:t>Utilizes</a:t>
-            </a:r>
-            <a:r>
-              <a:rPr lang="en-US" sz="2000" dirty="0">
-                <a:solidFill>
-                  <a:schemeClr val="bg1"/>
-                </a:solidFill>
-              </a:rPr>
-              <a:t> a separate unique identifier compared to all other CMS data</a:t>
-            </a:r>
-          </a:p>
-          <a:p>
-            <a:pPr lvl="2"/>
+              <a:t>Payment ID</a:t>
+            </a:r>
             <a:endParaRPr lang="en-US" sz="2000" dirty="0">
               <a:solidFill>
                 <a:schemeClr val="bg1"/>
@@ -4295,7 +4240,7 @@
     </p:spTree>
     <p:extLst>
       <p:ext uri="{BB962C8B-B14F-4D97-AF65-F5344CB8AC3E}">
-        <p14:creationId xmlns:p14="http://schemas.microsoft.com/office/powerpoint/2010/main" val="2742483056"/>
+        <p14:creationId xmlns:p14="http://schemas.microsoft.com/office/powerpoint/2010/main" val="3472358515"/>
       </p:ext>
     </p:extLst>
   </p:cSld>
@@ -4354,7 +4299,7 @@
         </p:nvSpPr>
         <p:spPr>
           <a:xfrm>
-            <a:off x="749491" y="730701"/>
+            <a:off x="749490" y="531408"/>
             <a:ext cx="10709949" cy="1188720"/>
           </a:xfrm>
           <a:noFill/>
@@ -4364,139 +4309,51 @@
         </p:spPr>
         <p:txBody>
           <a:bodyPr>
-            <a:normAutofit/>
+            <a:noAutofit/>
           </a:bodyPr>
           <a:lstStyle/>
           <a:p>
-            <a:pPr algn="l"/>
-            <a:r>
-              <a:rPr lang="en-US" sz="5400" dirty="0">
+            <a:r>
+              <a:rPr lang="en-US" sz="4000" dirty="0">
                 <a:solidFill>
                   <a:schemeClr val="bg1"/>
                 </a:solidFill>
+                <a:latin typeface="Gill Sans MT" panose="020B0502020104020203" pitchFamily="34" charset="77"/>
               </a:rPr>
-              <a:t>Data processing</a:t>
-            </a:r>
-          </a:p>
-        </p:txBody>
-      </p:sp>
-      <p:sp>
-        <p:nvSpPr>
-          <p:cNvPr id="3" name="Content Placeholder 2">
+              <a:t>How much was your Doctor paid?</a:t>
+            </a:r>
+          </a:p>
+        </p:txBody>
+      </p:sp>
+      <p:pic>
+        <p:nvPicPr>
+          <p:cNvPr id="7" name="Content Placeholder 6">
             <a:extLst>
               <a:ext uri="{FF2B5EF4-FFF2-40B4-BE49-F238E27FC236}">
-                <a16:creationId xmlns:a16="http://schemas.microsoft.com/office/drawing/2014/main" id="{94AAF4AB-BCE0-E841-ABA6-DD9C406CDD25}"/>
+                <a16:creationId xmlns:a16="http://schemas.microsoft.com/office/drawing/2014/main" id="{5FFE54EF-20E2-924C-B26F-E58208B8F300}"/>
               </a:ext>
             </a:extLst>
           </p:cNvPr>
-          <p:cNvSpPr>
-            <a:spLocks noGrp="1"/>
-          </p:cNvSpPr>
+          <p:cNvPicPr>
+            <a:picLocks noGrp="1" noChangeAspect="1"/>
+          </p:cNvPicPr>
           <p:nvPr>
             <p:ph idx="1"/>
           </p:nvPr>
-        </p:nvSpPr>
+        </p:nvPicPr>
+        <p:blipFill>
+          <a:blip r:embed="rId3"/>
+          <a:stretch>
+            <a:fillRect/>
+          </a:stretch>
+        </p:blipFill>
         <p:spPr>
           <a:xfrm>
-            <a:off x="1089474" y="2044924"/>
-            <a:ext cx="10369966" cy="3982502"/>
+            <a:off x="1764838" y="1631644"/>
+            <a:ext cx="8679251" cy="5010912"/>
           </a:xfrm>
         </p:spPr>
-        <p:txBody>
-          <a:bodyPr>
-            <a:normAutofit/>
-          </a:bodyPr>
-          <a:lstStyle/>
-          <a:p>
-            <a:pPr marL="0" indent="0">
-              <a:buNone/>
-            </a:pPr>
-            <a:r>
-              <a:rPr lang="en-US" sz="2400" u="sng" dirty="0">
-                <a:solidFill>
-                  <a:schemeClr val="bg1"/>
-                </a:solidFill>
-              </a:rPr>
-              <a:t>Challenge:</a:t>
-            </a:r>
-          </a:p>
-          <a:p>
-            <a:r>
-              <a:rPr lang="en-US" sz="2400" i="1" dirty="0">
-                <a:solidFill>
-                  <a:srgbClr val="FF9300"/>
-                </a:solidFill>
-              </a:rPr>
-              <a:t>Linking a doctor’s National Provider Identifier (NPI) to their unique Payment ID</a:t>
-            </a:r>
-          </a:p>
-          <a:p>
-            <a:pPr lvl="1">
-              <a:spcAft>
-                <a:spcPts val="600"/>
-              </a:spcAft>
-            </a:pPr>
-            <a:r>
-              <a:rPr lang="en-US" sz="2000" dirty="0">
-                <a:solidFill>
-                  <a:schemeClr val="bg1"/>
-                </a:solidFill>
-              </a:rPr>
-              <a:t>NPI was not used in Open Payments to prevent this</a:t>
-            </a:r>
-            <a:endParaRPr lang="en-US" sz="200" dirty="0">
-              <a:solidFill>
-                <a:schemeClr val="bg1"/>
-              </a:solidFill>
-            </a:endParaRPr>
-          </a:p>
-          <a:p>
-            <a:pPr marL="0" indent="0" algn="ctr">
-              <a:buNone/>
-            </a:pPr>
-            <a:r>
-              <a:rPr lang="en-US" sz="2800" i="1" dirty="0">
-                <a:solidFill>
-                  <a:schemeClr val="bg1"/>
-                </a:solidFill>
-              </a:rPr>
-              <a:t>Do the Payments Doctors receive from Pharmaceutical Companies affect the type of prescriptions they write?</a:t>
-            </a:r>
-          </a:p>
-          <a:p>
-            <a:r>
-              <a:rPr lang="en-US" sz="2400" u="sng" dirty="0">
-                <a:solidFill>
-                  <a:schemeClr val="bg1"/>
-                </a:solidFill>
-              </a:rPr>
-              <a:t>Datasets:</a:t>
-            </a:r>
-          </a:p>
-          <a:p>
-            <a:pPr lvl="1"/>
-            <a:r>
-              <a:rPr lang="en-US" sz="2000" dirty="0">
-                <a:solidFill>
-                  <a:schemeClr val="bg1"/>
-                </a:solidFill>
-              </a:rPr>
-              <a:t>Medicare Part D Prescriptions (NPI)</a:t>
-            </a:r>
-          </a:p>
-          <a:p>
-            <a:pPr lvl="1"/>
-            <a:r>
-              <a:rPr lang="en-US" sz="2000" dirty="0">
-                <a:solidFill>
-                  <a:schemeClr val="bg1"/>
-                </a:solidFill>
-              </a:rPr>
-              <a:t>Open Payments Database (Payment ID)</a:t>
-            </a:r>
-          </a:p>
-        </p:txBody>
-      </p:sp>
+      </p:pic>
       <p:sp>
         <p:nvSpPr>
           <p:cNvPr id="4" name="TextBox 3">
@@ -4575,7 +4432,7 @@
     </p:spTree>
     <p:extLst>
       <p:ext uri="{BB962C8B-B14F-4D97-AF65-F5344CB8AC3E}">
-        <p14:creationId xmlns:p14="http://schemas.microsoft.com/office/powerpoint/2010/main" val="739044958"/>
+        <p14:creationId xmlns:p14="http://schemas.microsoft.com/office/powerpoint/2010/main" val="1464164889"/>
       </p:ext>
     </p:extLst>
   </p:cSld>
@@ -4634,7 +4491,7 @@
         </p:nvSpPr>
         <p:spPr>
           <a:xfrm>
-            <a:off x="749491" y="730701"/>
+            <a:off x="749490" y="531408"/>
             <a:ext cx="10709949" cy="1188720"/>
           </a:xfrm>
           <a:noFill/>
@@ -4644,105 +4501,19 @@
         </p:spPr>
         <p:txBody>
           <a:bodyPr>
-            <a:normAutofit/>
+            <a:noAutofit/>
           </a:bodyPr>
           <a:lstStyle/>
           <a:p>
-            <a:pPr algn="l"/>
-            <a:r>
-              <a:rPr lang="en-US" sz="5400" dirty="0">
+            <a:r>
+              <a:rPr lang="en-US" sz="4000" dirty="0">
                 <a:solidFill>
                   <a:schemeClr val="bg1"/>
                 </a:solidFill>
+                <a:latin typeface="Gill Sans MT" panose="020B0502020104020203" pitchFamily="34" charset="77"/>
               </a:rPr>
-              <a:t>Data processing</a:t>
-            </a:r>
-          </a:p>
-        </p:txBody>
-      </p:sp>
-      <p:sp>
-        <p:nvSpPr>
-          <p:cNvPr id="3" name="Content Placeholder 2">
-            <a:extLst>
-              <a:ext uri="{FF2B5EF4-FFF2-40B4-BE49-F238E27FC236}">
-                <a16:creationId xmlns:a16="http://schemas.microsoft.com/office/drawing/2014/main" id="{94AAF4AB-BCE0-E841-ABA6-DD9C406CDD25}"/>
-              </a:ext>
-            </a:extLst>
-          </p:cNvPr>
-          <p:cNvSpPr>
-            <a:spLocks noGrp="1"/>
-          </p:cNvSpPr>
-          <p:nvPr>
-            <p:ph idx="1"/>
-          </p:nvPr>
-        </p:nvSpPr>
-        <p:spPr>
-          <a:xfrm>
-            <a:off x="1089474" y="2044924"/>
-            <a:ext cx="10369966" cy="3982502"/>
-          </a:xfrm>
-        </p:spPr>
-        <p:txBody>
-          <a:bodyPr>
-            <a:normAutofit/>
-          </a:bodyPr>
-          <a:lstStyle/>
-          <a:p>
-            <a:pPr marL="0" indent="0">
-              <a:buNone/>
-            </a:pPr>
-            <a:r>
-              <a:rPr lang="en-US" sz="2400" dirty="0">
-                <a:solidFill>
-                  <a:schemeClr val="bg1"/>
-                </a:solidFill>
-              </a:rPr>
-              <a:t>GRAPH SHOWING AMOUNT OF PAYMENTS OVER YEARS</a:t>
-            </a:r>
-          </a:p>
-          <a:p>
-            <a:pPr marL="0" indent="0">
-              <a:buNone/>
-            </a:pPr>
-            <a:r>
-              <a:rPr lang="en-US" sz="2400" dirty="0">
-                <a:solidFill>
-                  <a:schemeClr val="bg1"/>
-                </a:solidFill>
-              </a:rPr>
-              <a:t>PIE CHART SHOWING TYPES OF PAYMENTS</a:t>
-            </a:r>
-          </a:p>
-          <a:p>
-            <a:pPr marL="0" indent="0">
-              <a:buNone/>
-            </a:pPr>
-            <a:r>
-              <a:rPr lang="en-US" sz="2400" dirty="0">
-                <a:solidFill>
-                  <a:schemeClr val="bg1"/>
-                </a:solidFill>
-              </a:rPr>
-              <a:t>GRAPH SHOWING TOP COMPANIES PAID</a:t>
-            </a:r>
-          </a:p>
-          <a:p>
-            <a:pPr marL="0" indent="0">
-              <a:buNone/>
-            </a:pPr>
-            <a:r>
-              <a:rPr lang="en-US" sz="2400" dirty="0">
-                <a:solidFill>
-                  <a:schemeClr val="bg1"/>
-                </a:solidFill>
-              </a:rPr>
-              <a:t>GRAPH SHOWING TOP DOCTORS PAID</a:t>
-            </a:r>
-            <a:endParaRPr lang="en-US" sz="2000" dirty="0">
-              <a:solidFill>
-                <a:schemeClr val="bg1"/>
-              </a:solidFill>
-            </a:endParaRPr>
+              <a:t>How much was your Doctor paid?</a:t>
+            </a:r>
           </a:p>
         </p:txBody>
       </p:sp>
@@ -4821,10 +4592,39 @@
           </a:p>
         </p:txBody>
       </p:sp>
+      <p:pic>
+        <p:nvPicPr>
+          <p:cNvPr id="8" name="Content Placeholder 7">
+            <a:extLst>
+              <a:ext uri="{FF2B5EF4-FFF2-40B4-BE49-F238E27FC236}">
+                <a16:creationId xmlns:a16="http://schemas.microsoft.com/office/drawing/2014/main" id="{A0A882AC-C3E5-F04B-A475-148DE9A7822E}"/>
+              </a:ext>
+            </a:extLst>
+          </p:cNvPr>
+          <p:cNvPicPr>
+            <a:picLocks noGrp="1" noChangeAspect="1"/>
+          </p:cNvPicPr>
+          <p:nvPr>
+            <p:ph idx="1"/>
+          </p:nvPr>
+        </p:nvPicPr>
+        <p:blipFill>
+          <a:blip r:embed="rId3"/>
+          <a:stretch>
+            <a:fillRect/>
+          </a:stretch>
+        </p:blipFill>
+        <p:spPr>
+          <a:xfrm>
+            <a:off x="1756920" y="1622500"/>
+            <a:ext cx="8695088" cy="5020056"/>
+          </a:xfrm>
+        </p:spPr>
+      </p:pic>
     </p:spTree>
     <p:extLst>
       <p:ext uri="{BB962C8B-B14F-4D97-AF65-F5344CB8AC3E}">
-        <p14:creationId xmlns:p14="http://schemas.microsoft.com/office/powerpoint/2010/main" val="4253158841"/>
+        <p14:creationId xmlns:p14="http://schemas.microsoft.com/office/powerpoint/2010/main" val="4294052968"/>
       </p:ext>
     </p:extLst>
   </p:cSld>

</xml_diff>